<commit_message>
one more update to powerpoint
</commit_message>
<xml_diff>
--- a/Project 2 Presentation.pptx
+++ b/Project 2 Presentation.pptx
@@ -21488,7 +21488,7 @@
             </a:pPr>
             <a:r>
               <a:rPr lang="en-US" sz="1600" dirty="0"/>
-              <a:t>A combination of Web Scraping and Leaflet or </a:t>
+              <a:t>Web Scraping and Leaflet or </a:t>
             </a:r>
             <a:r>
               <a:rPr lang="en-US" sz="1600" dirty="0" err="1"/>
@@ -21523,26 +21523,24 @@
             <a:endParaRPr lang="en-US" sz="2000" dirty="0"/>
           </a:p>
           <a:p>
-            <a:pPr marL="0" indent="0">
+            <a:pPr lvl="1">
               <a:lnSpc>
                 <a:spcPct val="100000"/>
               </a:lnSpc>
               <a:spcBef>
                 <a:spcPts val="0"/>
               </a:spcBef>
-              <a:buNone/>
             </a:pPr>
-            <a:endParaRPr lang="en-US" sz="1600" dirty="0"/>
+            <a:endParaRPr lang="en-US" sz="2000" dirty="0"/>
           </a:p>
           <a:p>
-            <a:pPr marL="342900" indent="-342900">
+            <a:pPr lvl="1">
               <a:lnSpc>
                 <a:spcPct val="100000"/>
               </a:lnSpc>
               <a:spcBef>
                 <a:spcPts val="0"/>
               </a:spcBef>
-              <a:buAutoNum type="arabicPeriod"/>
             </a:pPr>
             <a:r>
               <a:rPr lang="en-US" sz="1600" dirty="0"/>
@@ -21554,30 +21552,28 @@
             </a:r>
           </a:p>
           <a:p>
-            <a:pPr marL="342900" indent="-342900">
+            <a:pPr lvl="1">
               <a:lnSpc>
                 <a:spcPct val="100000"/>
               </a:lnSpc>
               <a:spcBef>
                 <a:spcPts val="0"/>
               </a:spcBef>
-              <a:buAutoNum type="arabicPeriod"/>
             </a:pPr>
-            <a:endParaRPr lang="en-US" sz="1600" dirty="0"/>
+            <a:endParaRPr lang="en-US" sz="1600" b="1" dirty="0"/>
           </a:p>
           <a:p>
-            <a:pPr marL="342900" indent="-342900">
+            <a:pPr lvl="1">
               <a:lnSpc>
                 <a:spcPct val="100000"/>
               </a:lnSpc>
               <a:spcBef>
                 <a:spcPts val="0"/>
               </a:spcBef>
-              <a:buAutoNum type="arabicPeriod"/>
             </a:pPr>
             <a:r>
               <a:rPr lang="en-US" sz="1600" dirty="0"/>
-              <a:t>At least 100 records.  </a:t>
+              <a:t>Has at least 100 records.  </a:t>
             </a:r>
             <a:r>
               <a:rPr lang="en-US" sz="1600" b="1" dirty="0"/>
@@ -21585,30 +21581,28 @@
             </a:r>
           </a:p>
           <a:p>
-            <a:pPr marL="342900" indent="-342900">
+            <a:pPr lvl="1">
               <a:lnSpc>
                 <a:spcPct val="100000"/>
               </a:lnSpc>
               <a:spcBef>
                 <a:spcPts val="0"/>
               </a:spcBef>
-              <a:buAutoNum type="arabicPeriod"/>
             </a:pPr>
-            <a:endParaRPr lang="en-US" sz="1600" dirty="0"/>
+            <a:endParaRPr lang="en-US" sz="1600" b="1" dirty="0"/>
           </a:p>
           <a:p>
-            <a:pPr marL="342900" indent="-342900">
+            <a:pPr lvl="1">
               <a:lnSpc>
                 <a:spcPct val="100000"/>
               </a:lnSpc>
               <a:spcBef>
                 <a:spcPts val="0"/>
               </a:spcBef>
-              <a:buAutoNum type="arabicPeriod"/>
             </a:pPr>
             <a:r>
               <a:rPr lang="en-US" sz="1600" dirty="0"/>
-              <a:t>User-driven interaction (e.g. menus, dropdowns, textboxes, etc.). </a:t>
+              <a:t>Has ser-driven interaction (e.g. menus, dropdowns, textboxes, etc.). </a:t>
             </a:r>
             <a:r>
               <a:rPr lang="en-US" sz="1600" b="1" dirty="0"/>
@@ -21616,26 +21610,24 @@
             </a:r>
           </a:p>
           <a:p>
-            <a:pPr marL="342900" indent="-342900">
+            <a:pPr lvl="1">
               <a:lnSpc>
                 <a:spcPct val="100000"/>
               </a:lnSpc>
               <a:spcBef>
                 <a:spcPts val="0"/>
               </a:spcBef>
-              <a:buAutoNum type="arabicPeriod"/>
             </a:pPr>
-            <a:endParaRPr lang="en-US" sz="1600" dirty="0"/>
+            <a:endParaRPr lang="en-US" sz="1600" b="1" dirty="0"/>
           </a:p>
           <a:p>
-            <a:pPr marL="342900" indent="-342900">
+            <a:pPr lvl="1">
               <a:lnSpc>
                 <a:spcPct val="100000"/>
               </a:lnSpc>
               <a:spcBef>
                 <a:spcPts val="0"/>
               </a:spcBef>
-              <a:buAutoNum type="arabicPeriod"/>
             </a:pPr>
             <a:r>
               <a:rPr lang="en-US" sz="1600" dirty="0"/>
@@ -21922,7 +21914,7 @@
           <a:p>
             <a:r>
               <a:rPr lang="en-US" dirty="0"/>
-              <a:t>Properties analysis</a:t>
+              <a:t>Documents analysis</a:t>
             </a:r>
           </a:p>
         </p:txBody>
@@ -21970,8 +21962,8 @@
         </p:nvSpPr>
         <p:spPr>
           <a:xfrm>
-            <a:off x="730600" y="1997839"/>
-            <a:ext cx="4656155" cy="3970318"/>
+            <a:off x="776550" y="1820821"/>
+            <a:ext cx="4656155" cy="4616648"/>
           </a:xfrm>
           <a:prstGeom prst="rect">
             <a:avLst/>
@@ -21999,15 +21991,45 @@
           <a:p>
             <a:r>
               <a:rPr lang="en-US" dirty="0"/>
-              <a:t>In this case, academic publications for metal foams are classified by the materials used to make the foam (Aluminum, Copper, </a:t>
+              <a:t>In this case, academic publications for metal foams are classified by:</a:t>
+            </a:r>
+          </a:p>
+          <a:p>
+            <a:endParaRPr lang="en-US" dirty="0"/>
+          </a:p>
+          <a:p>
+            <a:pPr marL="742950" lvl="1" indent="-285750">
+              <a:buFont typeface="Arial" panose="020B0604020202020204" pitchFamily="34" charset="0"/>
+              <a:buChar char="•"/>
+            </a:pPr>
+            <a:r>
+              <a:rPr lang="en-US" sz="1600" dirty="0"/>
+              <a:t> the materials used to make the foam (Aluminum, Copper, </a:t>
             </a:r>
             <a:r>
-              <a:rPr lang="en-US" dirty="0" err="1"/>
+              <a:rPr lang="en-US" sz="1600" dirty="0" err="1"/>
               <a:t>etc</a:t>
             </a:r>
             <a:r>
-              <a:rPr lang="en-US" dirty="0"/>
-              <a:t>), and materials properties (e.g. strength, elasticity, conductivity), that were tested by the authors. </a:t>
+              <a:rPr lang="en-US" sz="1600" dirty="0"/>
+              <a:t>), and </a:t>
+            </a:r>
+          </a:p>
+          <a:p>
+            <a:pPr marL="742950" lvl="1" indent="-285750">
+              <a:buFont typeface="Arial" panose="020B0604020202020204" pitchFamily="34" charset="0"/>
+              <a:buChar char="•"/>
+            </a:pPr>
+            <a:endParaRPr lang="en-US" sz="1600" dirty="0"/>
+          </a:p>
+          <a:p>
+            <a:pPr marL="742950" lvl="1" indent="-285750">
+              <a:buFont typeface="Arial" panose="020B0604020202020204" pitchFamily="34" charset="0"/>
+              <a:buChar char="•"/>
+            </a:pPr>
+            <a:r>
+              <a:rPr lang="en-US" sz="1600" dirty="0"/>
+              <a:t>The materials properties (e.g. strength, elasticity, conductivity), that were tested by the authors. </a:t>
             </a:r>
           </a:p>
           <a:p>
@@ -22027,15 +22049,6 @@
               </a:rPr>
               <a:t>. </a:t>
             </a:r>
-          </a:p>
-          <a:p>
-            <a:endParaRPr lang="en-US" b="0" i="0" dirty="0">
-              <a:solidFill>
-                <a:srgbClr val="333333"/>
-              </a:solidFill>
-              <a:effectLst/>
-              <a:latin typeface="Helvetica Neue"/>
-            </a:endParaRPr>
           </a:p>
         </p:txBody>
       </p:sp>
@@ -22241,9 +22254,10 @@
           <a:lstStyle/>
           <a:p>
             <a:r>
-              <a:rPr lang="en-US" dirty="0"/>
-              <a:t>Publication timeline with Citations</a:t>
+              <a:rPr lang="en-US"/>
+              <a:t>Competitive Analysis</a:t>
             </a:r>
+            <a:endParaRPr lang="en-US" dirty="0"/>
           </a:p>
         </p:txBody>
       </p:sp>
@@ -22311,7 +22325,7 @@
           <a:p>
             <a:r>
               <a:rPr lang="en-US" dirty="0"/>
-              <a:t>This interactive bubble chart shows the evolution of research interest in metal foams, over time. The number of citations by others indicates the importance of the articles content. Ground-breaking articles may have hundreds or even thousands of citations. </a:t>
+              <a:t>The Publication Timeline shows evolution of research interest in metal foams, over time. The number of citations by others indicates the importance of the articles content. Ground-breaking articles may have hundreds or even thousands of citations. </a:t>
             </a:r>
           </a:p>
         </p:txBody>

</xml_diff>